<commit_message>
The youtube link is added
</commit_message>
<xml_diff>
--- a/CaseStudy01.pptx
+++ b/CaseStudy01.pptx
@@ -222,7 +222,7 @@
           <a:p>
             <a:fld id="{25AD23A5-A723-4852-8FCC-B74A58B16E4B}" type="datetimeFigureOut">
               <a:rPr lang="en-US" smtClean="0"/>
-              <a:t>10/21/21</a:t>
+              <a:t>10/22/21</a:t>
             </a:fld>
             <a:endParaRPr lang="en-US"/>
           </a:p>
@@ -1211,7 +1211,7 @@
           <a:p>
             <a:fld id="{7257C539-C123-4291-9FED-4426DE099567}" type="datetimeFigureOut">
               <a:rPr lang="en-US" smtClean="0"/>
-              <a:t>10/21/21</a:t>
+              <a:t>10/22/21</a:t>
             </a:fld>
             <a:endParaRPr lang="en-US"/>
           </a:p>
@@ -1462,7 +1462,7 @@
           <a:p>
             <a:fld id="{7257C539-C123-4291-9FED-4426DE099567}" type="datetimeFigureOut">
               <a:rPr lang="en-US" smtClean="0"/>
-              <a:t>10/21/21</a:t>
+              <a:t>10/22/21</a:t>
             </a:fld>
             <a:endParaRPr lang="en-US"/>
           </a:p>
@@ -1776,7 +1776,7 @@
           <a:p>
             <a:fld id="{7257C539-C123-4291-9FED-4426DE099567}" type="datetimeFigureOut">
               <a:rPr lang="en-US" smtClean="0"/>
-              <a:t>10/21/21</a:t>
+              <a:t>10/22/21</a:t>
             </a:fld>
             <a:endParaRPr lang="en-US"/>
           </a:p>
@@ -2117,7 +2117,7 @@
           <a:p>
             <a:fld id="{7257C539-C123-4291-9FED-4426DE099567}" type="datetimeFigureOut">
               <a:rPr lang="en-US" smtClean="0"/>
-              <a:t>10/21/21</a:t>
+              <a:t>10/22/21</a:t>
             </a:fld>
             <a:endParaRPr lang="en-US"/>
           </a:p>
@@ -2431,7 +2431,7 @@
           <a:p>
             <a:fld id="{7257C539-C123-4291-9FED-4426DE099567}" type="datetimeFigureOut">
               <a:rPr lang="en-US" smtClean="0"/>
-              <a:t>10/21/21</a:t>
+              <a:t>10/22/21</a:t>
             </a:fld>
             <a:endParaRPr lang="en-US"/>
           </a:p>
@@ -2824,7 +2824,7 @@
           <a:p>
             <a:fld id="{7257C539-C123-4291-9FED-4426DE099567}" type="datetimeFigureOut">
               <a:rPr lang="en-US" smtClean="0"/>
-              <a:t>10/21/21</a:t>
+              <a:t>10/22/21</a:t>
             </a:fld>
             <a:endParaRPr lang="en-US"/>
           </a:p>
@@ -2994,7 +2994,7 @@
           <a:p>
             <a:fld id="{7257C539-C123-4291-9FED-4426DE099567}" type="datetimeFigureOut">
               <a:rPr lang="en-US" smtClean="0"/>
-              <a:t>10/21/21</a:t>
+              <a:t>10/22/21</a:t>
             </a:fld>
             <a:endParaRPr lang="en-US"/>
           </a:p>
@@ -3174,7 +3174,7 @@
           <a:p>
             <a:fld id="{7257C539-C123-4291-9FED-4426DE099567}" type="datetimeFigureOut">
               <a:rPr lang="en-US" smtClean="0"/>
-              <a:t>10/21/21</a:t>
+              <a:t>10/22/21</a:t>
             </a:fld>
             <a:endParaRPr lang="en-US"/>
           </a:p>
@@ -3350,7 +3350,7 @@
           <a:p>
             <a:fld id="{7257C539-C123-4291-9FED-4426DE099567}" type="datetimeFigureOut">
               <a:rPr lang="en-US" smtClean="0"/>
-              <a:t>10/21/21</a:t>
+              <a:t>10/22/21</a:t>
             </a:fld>
             <a:endParaRPr lang="en-US"/>
           </a:p>
@@ -3597,7 +3597,7 @@
           <a:p>
             <a:fld id="{7257C539-C123-4291-9FED-4426DE099567}" type="datetimeFigureOut">
               <a:rPr lang="en-US" smtClean="0"/>
-              <a:t>10/21/21</a:t>
+              <a:t>10/22/21</a:t>
             </a:fld>
             <a:endParaRPr lang="en-US"/>
           </a:p>
@@ -3829,7 +3829,7 @@
           <a:p>
             <a:fld id="{7257C539-C123-4291-9FED-4426DE099567}" type="datetimeFigureOut">
               <a:rPr lang="en-US" smtClean="0"/>
-              <a:t>10/21/21</a:t>
+              <a:t>10/22/21</a:t>
             </a:fld>
             <a:endParaRPr lang="en-US"/>
           </a:p>
@@ -4203,7 +4203,7 @@
           <a:p>
             <a:fld id="{7257C539-C123-4291-9FED-4426DE099567}" type="datetimeFigureOut">
               <a:rPr lang="en-US" smtClean="0"/>
-              <a:t>10/21/21</a:t>
+              <a:t>10/22/21</a:t>
             </a:fld>
             <a:endParaRPr lang="en-US"/>
           </a:p>
@@ -4326,7 +4326,7 @@
           <a:p>
             <a:fld id="{7257C539-C123-4291-9FED-4426DE099567}" type="datetimeFigureOut">
               <a:rPr lang="en-US" smtClean="0"/>
-              <a:t>10/21/21</a:t>
+              <a:t>10/22/21</a:t>
             </a:fld>
             <a:endParaRPr lang="en-US"/>
           </a:p>
@@ -4421,7 +4421,7 @@
           <a:p>
             <a:fld id="{7257C539-C123-4291-9FED-4426DE099567}" type="datetimeFigureOut">
               <a:rPr lang="en-US" smtClean="0"/>
-              <a:t>10/21/21</a:t>
+              <a:t>10/22/21</a:t>
             </a:fld>
             <a:endParaRPr lang="en-US"/>
           </a:p>
@@ -4676,7 +4676,7 @@
           <a:p>
             <a:fld id="{7257C539-C123-4291-9FED-4426DE099567}" type="datetimeFigureOut">
               <a:rPr lang="en-US" smtClean="0"/>
-              <a:t>10/21/21</a:t>
+              <a:t>10/22/21</a:t>
             </a:fld>
             <a:endParaRPr lang="en-US"/>
           </a:p>
@@ -4939,7 +4939,7 @@
           <a:p>
             <a:fld id="{7257C539-C123-4291-9FED-4426DE099567}" type="datetimeFigureOut">
               <a:rPr lang="en-US" smtClean="0"/>
-              <a:t>10/21/21</a:t>
+              <a:t>10/22/21</a:t>
             </a:fld>
             <a:endParaRPr lang="en-US"/>
           </a:p>
@@ -5682,7 +5682,7 @@
           <a:p>
             <a:fld id="{7257C539-C123-4291-9FED-4426DE099567}" type="datetimeFigureOut">
               <a:rPr lang="en-US" smtClean="0"/>
-              <a:t>10/21/21</a:t>
+              <a:t>10/22/21</a:t>
             </a:fld>
             <a:endParaRPr lang="en-US"/>
           </a:p>
@@ -16532,6 +16532,51 @@
           </a:prstGeom>
         </p:spPr>
       </p:pic>
+      <p:sp>
+        <p:nvSpPr>
+          <p:cNvPr id="2" name="TextBox 1">
+            <a:extLst>
+              <a:ext uri="{FF2B5EF4-FFF2-40B4-BE49-F238E27FC236}">
+                <a16:creationId xmlns:a16="http://schemas.microsoft.com/office/drawing/2014/main" id="{CDCEC43F-044D-EA49-BCB4-93B6A000F565}"/>
+              </a:ext>
+            </a:extLst>
+          </p:cNvPr>
+          <p:cNvSpPr txBox="1"/>
+          <p:nvPr/>
+        </p:nvSpPr>
+        <p:spPr>
+          <a:xfrm>
+            <a:off x="2188029" y="5627914"/>
+            <a:ext cx="4065344" cy="369332"/>
+          </a:xfrm>
+          <a:prstGeom prst="rect">
+            <a:avLst/>
+          </a:prstGeom>
+          <a:noFill/>
+        </p:spPr>
+        <p:txBody>
+          <a:bodyPr wrap="none" rtlCol="0">
+            <a:spAutoFit/>
+          </a:bodyPr>
+          <a:lstStyle/>
+          <a:p>
+            <a:r>
+              <a:rPr lang="en-US" dirty="0"/>
+              <a:t>See more information at my </a:t>
+            </a:r>
+            <a:r>
+              <a:rPr lang="en-US" dirty="0">
+                <a:hlinkClick r:id="rId3"/>
+              </a:rPr>
+              <a:t>YouTube</a:t>
+            </a:r>
+            <a:r>
+              <a:rPr lang="en-US" dirty="0"/>
+              <a:t>:</a:t>
+            </a:r>
+          </a:p>
+        </p:txBody>
+      </p:sp>
     </p:spTree>
     <p:extLst>
       <p:ext uri="{BB962C8B-B14F-4D97-AF65-F5344CB8AC3E}">

</xml_diff>